<commit_message>
added a short intro
</commit_message>
<xml_diff>
--- a/poster/PosterPresentation.pptx
+++ b/poster/PosterPresentation.pptx
@@ -9212,12 +9212,22 @@
             <p:ph type="body" sz="quarter" idx="10"/>
           </p:nvPr>
         </p:nvSpPr>
-        <p:spPr/>
+        <p:spPr>
+          <a:xfrm>
+            <a:off x="1054885" y="5688525"/>
+            <a:ext cx="15856490" cy="6436900"/>
+          </a:xfrm>
+        </p:spPr>
         <p:txBody>
           <a:bodyPr/>
           <a:lstStyle/>
           <a:p>
-            <a:endParaRPr lang="en-US" dirty="0"/>
+            <a:r>
+              <a:rPr lang="en-US" sz="3200" dirty="0">
+                <a:effectLst/>
+              </a:rPr>
+              <a:t>The project explores the application of diverse machine learning algorithms such as Logistic Regression, Support Vector Machines (SVM), and Linear Discriminant Analysis (LDA) for the purpose of developing a music recommendation system. Our study aims to closely analyze the efficacy of these algorithms in modeling user preferences and delivering tailored music suggestions. Several preprocessing steps have been performed to ensure that the dataset leads to optimal results. Hyperparameter tuning, feature selection, and evaluation metrics have been used to evaluate the performance of each model. This thorough investigation not only contributes to the ongoing efforts to enhance music recommendation systems but also provides insights into the strengths and limitations of each machine learning approach within the context of personalized music delivery.</a:t>
+            </a:r>
           </a:p>
         </p:txBody>
       </p:sp>
@@ -9372,7 +9382,7 @@
           <a:bodyPr/>
           <a:lstStyle/>
           <a:p>
-            <a:endParaRPr lang="en-US"/>
+            <a:endParaRPr lang="en-US" dirty="0"/>
           </a:p>
         </p:txBody>
       </p:sp>
@@ -9605,15 +9615,7 @@
           <a:p>
             <a:r>
               <a:rPr lang="en-US" dirty="0"/>
-              <a:t>Georgetown </a:t>
-            </a:r>
-            <a:r>
-              <a:rPr lang="en-US" dirty="0" err="1"/>
-              <a:t>Univeristy</a:t>
-            </a:r>
-            <a:r>
-              <a:rPr lang="en-US" dirty="0"/>
-              <a:t>, Data Science &amp; Analytics</a:t>
+              <a:t>Georgetown University, Data Science &amp; Analytics</a:t>
             </a:r>
           </a:p>
         </p:txBody>

</xml_diff>